<commit_message>
Update research, fixed people bug
Research can not have authors in file
</commit_message>
<xml_diff>
--- a/templates/research_template/image_size.pptx
+++ b/templates/research_template/image_size.pptx
@@ -9,6 +9,7 @@
     <p:sldId id="258" r:id="rId3"/>
     <p:sldId id="259" r:id="rId4"/>
     <p:sldId id="260" r:id="rId5"/>
+    <p:sldId id="261" r:id="rId6"/>
   </p:sldIdLst>
   <p:sldSz cx="7199313" cy="3600450"/>
   <p:notesSz cx="6858000" cy="9144000"/>
@@ -107,6 +108,11 @@
       </a:defRPr>
     </a:lvl9pPr>
   </p:defaultTextStyle>
+  <p:extLst>
+    <p:ext uri="{EFAFB233-063F-42B5-8137-9DF3F51BA10A}">
+      <p15:sldGuideLst xmlns:p15="http://schemas.microsoft.com/office/powerpoint/2012/main"/>
+    </p:ext>
+  </p:extLst>
 </p:presentation>
 </file>
 
@@ -3115,40 +3121,35 @@
         </p:nvSpPr>
         <p:spPr>
           <a:xfrm>
-            <a:off x="0" y="0"/>
+            <a:off x="-1" y="0"/>
             <a:ext cx="7199313" cy="3600450"/>
           </a:xfrm>
           <a:prstGeom prst="rect">
             <a:avLst/>
           </a:prstGeom>
-          <a:gradFill>
+          <a:gradFill flip="none" rotWithShape="1">
             <a:gsLst>
               <a:gs pos="0">
-                <a:schemeClr val="accent1">
-                  <a:lumMod val="5000"/>
-                  <a:lumOff val="95000"/>
-                </a:schemeClr>
+                <a:srgbClr val="696D54">
+                  <a:tint val="66000"/>
+                  <a:satMod val="160000"/>
+                </a:srgbClr>
               </a:gs>
-              <a:gs pos="74000">
-                <a:schemeClr val="accent1">
-                  <a:lumMod val="45000"/>
-                  <a:lumOff val="55000"/>
-                </a:schemeClr>
-              </a:gs>
-              <a:gs pos="83000">
-                <a:schemeClr val="accent1">
-                  <a:lumMod val="45000"/>
-                  <a:lumOff val="55000"/>
-                </a:schemeClr>
+              <a:gs pos="50000">
+                <a:srgbClr val="696D54">
+                  <a:tint val="44500"/>
+                  <a:satMod val="160000"/>
+                </a:srgbClr>
               </a:gs>
               <a:gs pos="100000">
-                <a:schemeClr val="accent1">
-                  <a:lumMod val="30000"/>
-                  <a:lumOff val="70000"/>
-                </a:schemeClr>
+                <a:srgbClr val="696D54">
+                  <a:tint val="23500"/>
+                  <a:satMod val="160000"/>
+                </a:srgbClr>
               </a:gs>
             </a:gsLst>
-            <a:lin ang="5400000" scaled="1"/>
+            <a:lin ang="10800000" scaled="1"/>
+            <a:tileRect/>
           </a:gradFill>
           <a:ln>
             <a:solidFill>
@@ -3209,12 +3210,15 @@
         </p:blipFill>
         <p:spPr>
           <a:xfrm>
-            <a:off x="0" y="938808"/>
+            <a:off x="0" y="481608"/>
             <a:ext cx="7199313" cy="2699742"/>
           </a:xfrm>
           <a:prstGeom prst="rect">
             <a:avLst/>
           </a:prstGeom>
+          <a:effectLst>
+            <a:softEdge rad="279400"/>
+          </a:effectLst>
         </p:spPr>
       </p:pic>
     </p:spTree>
@@ -3283,6 +3287,148 @@
     <p:extLst>
       <p:ext uri="{BB962C8B-B14F-4D97-AF65-F5344CB8AC3E}">
         <p14:creationId xmlns:p14="http://schemas.microsoft.com/office/powerpoint/2010/main" val="1963578498"/>
+      </p:ext>
+    </p:extLst>
+  </p:cSld>
+  <p:clrMapOvr>
+    <a:masterClrMapping/>
+  </p:clrMapOvr>
+</p:sld>
+</file>
+
+<file path=ppt/slides/slide5.xml><?xml version="1.0" encoding="utf-8"?>
+<p:sld xmlns:a="http://schemas.openxmlformats.org/drawingml/2006/main" xmlns:r="http://schemas.openxmlformats.org/officeDocument/2006/relationships" xmlns:p="http://schemas.openxmlformats.org/presentationml/2006/main">
+  <p:cSld>
+    <p:spTree>
+      <p:nvGrpSpPr>
+        <p:cNvPr id="1" name=""/>
+        <p:cNvGrpSpPr/>
+        <p:nvPr/>
+      </p:nvGrpSpPr>
+      <p:grpSpPr>
+        <a:xfrm>
+          <a:off x="0" y="0"/>
+          <a:ext cx="0" cy="0"/>
+          <a:chOff x="0" y="0"/>
+          <a:chExt cx="0" cy="0"/>
+        </a:xfrm>
+      </p:grpSpPr>
+      <p:sp>
+        <p:nvSpPr>
+          <p:cNvPr id="6" name="矩形 5">
+            <a:extLst>
+              <a:ext uri="{FF2B5EF4-FFF2-40B4-BE49-F238E27FC236}">
+                <a16:creationId xmlns:a16="http://schemas.microsoft.com/office/drawing/2014/main" id="{BB116FDD-FA96-4B3E-BD86-BF1F5F204063}"/>
+              </a:ext>
+            </a:extLst>
+          </p:cNvPr>
+          <p:cNvSpPr/>
+          <p:nvPr/>
+        </p:nvSpPr>
+        <p:spPr>
+          <a:xfrm>
+            <a:off x="-1" y="0"/>
+            <a:ext cx="7199313" cy="3600450"/>
+          </a:xfrm>
+          <a:prstGeom prst="rect">
+            <a:avLst/>
+          </a:prstGeom>
+          <a:gradFill flip="none" rotWithShape="1">
+            <a:gsLst>
+              <a:gs pos="0">
+                <a:srgbClr val="696D54">
+                  <a:tint val="66000"/>
+                  <a:satMod val="160000"/>
+                </a:srgbClr>
+              </a:gs>
+              <a:gs pos="50000">
+                <a:srgbClr val="696D54">
+                  <a:tint val="44500"/>
+                  <a:satMod val="160000"/>
+                </a:srgbClr>
+              </a:gs>
+              <a:gs pos="100000">
+                <a:srgbClr val="696D54">
+                  <a:tint val="23500"/>
+                  <a:satMod val="160000"/>
+                </a:srgbClr>
+              </a:gs>
+            </a:gsLst>
+            <a:lin ang="10800000" scaled="1"/>
+            <a:tileRect/>
+          </a:gradFill>
+          <a:ln>
+            <a:solidFill>
+              <a:schemeClr val="bg1"/>
+            </a:solidFill>
+          </a:ln>
+        </p:spPr>
+        <p:style>
+          <a:lnRef idx="2">
+            <a:schemeClr val="accent1">
+              <a:shade val="50000"/>
+            </a:schemeClr>
+          </a:lnRef>
+          <a:fillRef idx="1">
+            <a:schemeClr val="accent1"/>
+          </a:fillRef>
+          <a:effectRef idx="0">
+            <a:schemeClr val="accent1"/>
+          </a:effectRef>
+          <a:fontRef idx="minor">
+            <a:schemeClr val="lt1"/>
+          </a:fontRef>
+        </p:style>
+        <p:txBody>
+          <a:bodyPr rtlCol="0" anchor="ctr"/>
+          <a:lstStyle/>
+          <a:p>
+            <a:pPr algn="ctr"/>
+            <a:endParaRPr lang="zh-CN" altLang="en-US"/>
+          </a:p>
+        </p:txBody>
+      </p:sp>
+      <p:pic>
+        <p:nvPicPr>
+          <p:cNvPr id="5" name="内容占位符 4">
+            <a:extLst>
+              <a:ext uri="{FF2B5EF4-FFF2-40B4-BE49-F238E27FC236}">
+                <a16:creationId xmlns:a16="http://schemas.microsoft.com/office/drawing/2014/main" id="{4952287D-642F-4DBC-8C90-6F896C639959}"/>
+              </a:ext>
+            </a:extLst>
+          </p:cNvPr>
+          <p:cNvPicPr>
+            <a:picLocks noGrp="1" noChangeAspect="1"/>
+          </p:cNvPicPr>
+          <p:nvPr>
+            <p:ph idx="1"/>
+          </p:nvPr>
+        </p:nvPicPr>
+        <p:blipFill rotWithShape="1">
+          <a:blip r:embed="rId2">
+            <a:extLst>
+              <a:ext uri="{28A0092B-C50C-407E-A947-70E740481C1C}">
+                <a14:useLocalDpi xmlns:a14="http://schemas.microsoft.com/office/drawing/2010/main" val="0"/>
+              </a:ext>
+            </a:extLst>
+          </a:blip>
+          <a:srcRect l="8870" r="8803"/>
+          <a:stretch/>
+        </p:blipFill>
+        <p:spPr>
+          <a:xfrm>
+            <a:off x="494953" y="30147"/>
+            <a:ext cx="5873656" cy="3570303"/>
+          </a:xfrm>
+          <a:effectLst>
+            <a:softEdge rad="292100"/>
+          </a:effectLst>
+        </p:spPr>
+      </p:pic>
+    </p:spTree>
+    <p:extLst>
+      <p:ext uri="{BB962C8B-B14F-4D97-AF65-F5344CB8AC3E}">
+        <p14:creationId xmlns:p14="http://schemas.microsoft.com/office/powerpoint/2010/main" val="2211264219"/>
       </p:ext>
     </p:extLst>
   </p:cSld>

</xml_diff>